<commit_message>
made ppt in tex
</commit_message>
<xml_diff>
--- a/docs/Presentation/Attendance Assitant PPT.pptx
+++ b/docs/Presentation/Attendance Assitant PPT.pptx
@@ -286,7 +286,7 @@
           <a:p>
             <a:fld id="{C579206C-5B60-4094-B83F-DCC9BA072F98}" type="datetimeFigureOut">
               <a:rPr lang="en-IN" smtClean="0"/>
-              <a:t>02-02-2024</a:t>
+              <a:t>05-02-2024</a:t>
             </a:fld>
             <a:endParaRPr lang="en-IN"/>
           </a:p>
@@ -486,7 +486,7 @@
           <a:p>
             <a:fld id="{C579206C-5B60-4094-B83F-DCC9BA072F98}" type="datetimeFigureOut">
               <a:rPr lang="en-IN" smtClean="0"/>
-              <a:t>02-02-2024</a:t>
+              <a:t>05-02-2024</a:t>
             </a:fld>
             <a:endParaRPr lang="en-IN"/>
           </a:p>
@@ -696,7 +696,7 @@
           <a:p>
             <a:fld id="{C579206C-5B60-4094-B83F-DCC9BA072F98}" type="datetimeFigureOut">
               <a:rPr lang="en-IN" smtClean="0"/>
-              <a:t>02-02-2024</a:t>
+              <a:t>05-02-2024</a:t>
             </a:fld>
             <a:endParaRPr lang="en-IN"/>
           </a:p>
@@ -900,7 +900,7 @@
           <a:p>
             <a:fld id="{C579206C-5B60-4094-B83F-DCC9BA072F98}" type="datetimeFigureOut">
               <a:rPr lang="en-IN" smtClean="0"/>
-              <a:t>02-02-2024</a:t>
+              <a:t>05-02-2024</a:t>
             </a:fld>
             <a:endParaRPr lang="en-IN"/>
           </a:p>
@@ -1176,7 +1176,7 @@
           <a:p>
             <a:fld id="{C579206C-5B60-4094-B83F-DCC9BA072F98}" type="datetimeFigureOut">
               <a:rPr lang="en-IN" smtClean="0"/>
-              <a:t>02-02-2024</a:t>
+              <a:t>05-02-2024</a:t>
             </a:fld>
             <a:endParaRPr lang="en-IN"/>
           </a:p>
@@ -1444,7 +1444,7 @@
           <a:p>
             <a:fld id="{C579206C-5B60-4094-B83F-DCC9BA072F98}" type="datetimeFigureOut">
               <a:rPr lang="en-IN" smtClean="0"/>
-              <a:t>02-02-2024</a:t>
+              <a:t>05-02-2024</a:t>
             </a:fld>
             <a:endParaRPr lang="en-IN"/>
           </a:p>
@@ -1859,7 +1859,7 @@
           <a:p>
             <a:fld id="{C579206C-5B60-4094-B83F-DCC9BA072F98}" type="datetimeFigureOut">
               <a:rPr lang="en-IN" smtClean="0"/>
-              <a:t>02-02-2024</a:t>
+              <a:t>05-02-2024</a:t>
             </a:fld>
             <a:endParaRPr lang="en-IN"/>
           </a:p>
@@ -2001,7 +2001,7 @@
           <a:p>
             <a:fld id="{C579206C-5B60-4094-B83F-DCC9BA072F98}" type="datetimeFigureOut">
               <a:rPr lang="en-IN" smtClean="0"/>
-              <a:t>02-02-2024</a:t>
+              <a:t>05-02-2024</a:t>
             </a:fld>
             <a:endParaRPr lang="en-IN"/>
           </a:p>
@@ -2114,7 +2114,7 @@
           <a:p>
             <a:fld id="{C579206C-5B60-4094-B83F-DCC9BA072F98}" type="datetimeFigureOut">
               <a:rPr lang="en-IN" smtClean="0"/>
-              <a:t>02-02-2024</a:t>
+              <a:t>05-02-2024</a:t>
             </a:fld>
             <a:endParaRPr lang="en-IN"/>
           </a:p>
@@ -2427,7 +2427,7 @@
           <a:p>
             <a:fld id="{C579206C-5B60-4094-B83F-DCC9BA072F98}" type="datetimeFigureOut">
               <a:rPr lang="en-IN" smtClean="0"/>
-              <a:t>02-02-2024</a:t>
+              <a:t>05-02-2024</a:t>
             </a:fld>
             <a:endParaRPr lang="en-IN"/>
           </a:p>
@@ -2716,7 +2716,7 @@
           <a:p>
             <a:fld id="{C579206C-5B60-4094-B83F-DCC9BA072F98}" type="datetimeFigureOut">
               <a:rPr lang="en-IN" smtClean="0"/>
-              <a:t>02-02-2024</a:t>
+              <a:t>05-02-2024</a:t>
             </a:fld>
             <a:endParaRPr lang="en-IN"/>
           </a:p>
@@ -2959,7 +2959,7 @@
           <a:p>
             <a:fld id="{C579206C-5B60-4094-B83F-DCC9BA072F98}" type="datetimeFigureOut">
               <a:rPr lang="en-IN" smtClean="0"/>
-              <a:t>02-02-2024</a:t>
+              <a:t>05-02-2024</a:t>
             </a:fld>
             <a:endParaRPr lang="en-IN"/>
           </a:p>
@@ -3394,7 +3394,7 @@
         </p:nvSpPr>
         <p:spPr>
           <a:xfrm>
-            <a:off x="414617" y="2412008"/>
+            <a:off x="210796" y="2396242"/>
             <a:ext cx="11362765" cy="1028501"/>
           </a:xfrm>
         </p:spPr>
@@ -3416,7 +3416,6 @@
                     <a:lumMod val="75000"/>
                   </a:schemeClr>
                 </a:solidFill>
-                <a:latin typeface="Calibri" panose="020F0502020204030204" pitchFamily="34" charset="0"/>
                 <a:ea typeface="Calibri" panose="020F0502020204030204" pitchFamily="34" charset="0"/>
                 <a:cs typeface="Calibri" panose="020F0502020204030204" pitchFamily="34" charset="0"/>
               </a:rPr>
@@ -3427,7 +3426,6 @@
                 <a:solidFill>
                   <a:srgbClr val="002060"/>
                 </a:solidFill>
-                <a:latin typeface="Calibri" panose="020F0502020204030204" pitchFamily="34" charset="0"/>
                 <a:ea typeface="Calibri" panose="020F0502020204030204" pitchFamily="34" charset="0"/>
                 <a:cs typeface="Calibri" panose="020F0502020204030204" pitchFamily="34" charset="0"/>
               </a:rPr>
@@ -3438,14 +3436,12 @@
                 <a:solidFill>
                   <a:srgbClr val="002060"/>
                 </a:solidFill>
-                <a:latin typeface="Calibri" panose="020F0502020204030204" pitchFamily="34" charset="0"/>
                 <a:ea typeface="Calibri" panose="020F0502020204030204" pitchFamily="34" charset="0"/>
                 <a:cs typeface="Calibri" panose="020F0502020204030204" pitchFamily="34" charset="0"/>
               </a:rPr>
             </a:br>
             <a:r>
               <a:rPr lang="en-US" sz="2800" dirty="0">
-                <a:latin typeface="Calibri" panose="020F0502020204030204" pitchFamily="34" charset="0"/>
                 <a:ea typeface="Calibri" panose="020F0502020204030204" pitchFamily="34" charset="0"/>
                 <a:cs typeface="Calibri" panose="020F0502020204030204" pitchFamily="34" charset="0"/>
               </a:rPr>
@@ -3472,7 +3468,7 @@
         </p:nvSpPr>
         <p:spPr>
           <a:xfrm>
-            <a:off x="1344141" y="5065059"/>
+            <a:off x="1140320" y="5049293"/>
             <a:ext cx="10068261" cy="1607965"/>
           </a:xfrm>
         </p:spPr>
@@ -3498,7 +3494,7 @@
                 <a:solidFill>
                   <a:srgbClr val="002060"/>
                 </a:solidFill>
-                <a:latin typeface="Calibri" panose="020F0502020204030204" pitchFamily="34" charset="0"/>
+                <a:latin typeface="+mj-lt"/>
                 <a:ea typeface="Calibri" panose="020F0502020204030204" pitchFamily="34" charset="0"/>
                 <a:cs typeface="Calibri" panose="020F0502020204030204" pitchFamily="34" charset="0"/>
               </a:rPr>
@@ -3519,7 +3515,7 @@
             </a:pPr>
             <a:r>
               <a:rPr lang="en-IN" sz="2000" dirty="0">
-                <a:latin typeface="Calibri" panose="020F0502020204030204" pitchFamily="34" charset="0"/>
+                <a:latin typeface="+mj-lt"/>
                 <a:ea typeface="Calibri" panose="020F0502020204030204" pitchFamily="34" charset="0"/>
                 <a:cs typeface="Calibri" panose="020F0502020204030204" pitchFamily="34" charset="0"/>
               </a:rPr>
@@ -3527,14 +3523,14 @@
             </a:r>
             <a:br>
               <a:rPr lang="en-IN" sz="2000" dirty="0">
-                <a:latin typeface="Calibri" panose="020F0502020204030204" pitchFamily="34" charset="0"/>
+                <a:latin typeface="+mj-lt"/>
                 <a:ea typeface="Calibri" panose="020F0502020204030204" pitchFamily="34" charset="0"/>
                 <a:cs typeface="Calibri" panose="020F0502020204030204" pitchFamily="34" charset="0"/>
               </a:rPr>
             </a:br>
             <a:r>
               <a:rPr lang="en-IN" sz="2000" dirty="0">
-                <a:latin typeface="Calibri" panose="020F0502020204030204" pitchFamily="34" charset="0"/>
+                <a:latin typeface="+mj-lt"/>
                 <a:ea typeface="Calibri" panose="020F0502020204030204" pitchFamily="34" charset="0"/>
                 <a:cs typeface="Calibri" panose="020F0502020204030204" pitchFamily="34" charset="0"/>
               </a:rPr>
@@ -3542,7 +3538,7 @@
             </a:r>
             <a:r>
               <a:rPr lang="en-IN" sz="2000" dirty="0" err="1">
-                <a:latin typeface="Calibri" panose="020F0502020204030204" pitchFamily="34" charset="0"/>
+                <a:latin typeface="+mj-lt"/>
                 <a:ea typeface="Calibri" panose="020F0502020204030204" pitchFamily="34" charset="0"/>
                 <a:cs typeface="Calibri" panose="020F0502020204030204" pitchFamily="34" charset="0"/>
               </a:rPr>
@@ -3550,7 +3546,7 @@
             </a:r>
             <a:r>
               <a:rPr lang="en-IN" sz="2000" dirty="0">
-                <a:latin typeface="Calibri" panose="020F0502020204030204" pitchFamily="34" charset="0"/>
+                <a:latin typeface="+mj-lt"/>
                 <a:ea typeface="Calibri" panose="020F0502020204030204" pitchFamily="34" charset="0"/>
                 <a:cs typeface="Calibri" panose="020F0502020204030204" pitchFamily="34" charset="0"/>
               </a:rPr>
@@ -3558,7 +3554,7 @@
             </a:r>
             <a:r>
               <a:rPr lang="en-IN" sz="2000" dirty="0" err="1">
-                <a:latin typeface="Calibri" panose="020F0502020204030204" pitchFamily="34" charset="0"/>
+                <a:latin typeface="+mj-lt"/>
                 <a:ea typeface="Calibri" panose="020F0502020204030204" pitchFamily="34" charset="0"/>
                 <a:cs typeface="Calibri" panose="020F0502020204030204" pitchFamily="34" charset="0"/>
               </a:rPr>
@@ -3566,7 +3562,7 @@
             </a:r>
             <a:r>
               <a:rPr lang="en-IN" sz="2000" dirty="0">
-                <a:latin typeface="Calibri" panose="020F0502020204030204" pitchFamily="34" charset="0"/>
+                <a:latin typeface="+mj-lt"/>
                 <a:ea typeface="Calibri" panose="020F0502020204030204" pitchFamily="34" charset="0"/>
                 <a:cs typeface="Calibri" panose="020F0502020204030204" pitchFamily="34" charset="0"/>
               </a:rPr>
@@ -3574,14 +3570,14 @@
             </a:r>
             <a:br>
               <a:rPr lang="en-IN" sz="2000" dirty="0">
-                <a:latin typeface="Calibri" panose="020F0502020204030204" pitchFamily="34" charset="0"/>
+                <a:latin typeface="+mj-lt"/>
                 <a:ea typeface="Calibri" panose="020F0502020204030204" pitchFamily="34" charset="0"/>
                 <a:cs typeface="Calibri" panose="020F0502020204030204" pitchFamily="34" charset="0"/>
               </a:rPr>
             </a:br>
             <a:r>
               <a:rPr lang="en-IN" sz="2000" dirty="0">
-                <a:latin typeface="Calibri" panose="020F0502020204030204" pitchFamily="34" charset="0"/>
+                <a:latin typeface="+mj-lt"/>
                 <a:ea typeface="Calibri" panose="020F0502020204030204" pitchFamily="34" charset="0"/>
                 <a:cs typeface="Calibri" panose="020F0502020204030204" pitchFamily="34" charset="0"/>
               </a:rPr>
@@ -3589,7 +3585,7 @@
             </a:r>
             <a:r>
               <a:rPr lang="en-IN" sz="2000" dirty="0" err="1">
-                <a:latin typeface="Calibri" panose="020F0502020204030204" pitchFamily="34" charset="0"/>
+                <a:latin typeface="+mj-lt"/>
                 <a:ea typeface="Calibri" panose="020F0502020204030204" pitchFamily="34" charset="0"/>
                 <a:cs typeface="Calibri" panose="020F0502020204030204" pitchFamily="34" charset="0"/>
               </a:rPr>
@@ -3597,7 +3593,7 @@
             </a:r>
             <a:r>
               <a:rPr lang="en-IN" sz="2000" dirty="0">
-                <a:latin typeface="Calibri" panose="020F0502020204030204" pitchFamily="34" charset="0"/>
+                <a:latin typeface="+mj-lt"/>
                 <a:ea typeface="Calibri" panose="020F0502020204030204" pitchFamily="34" charset="0"/>
                 <a:cs typeface="Calibri" panose="020F0502020204030204" pitchFamily="34" charset="0"/>
               </a:rPr>
@@ -3605,7 +3601,7 @@
             </a:r>
             <a:r>
               <a:rPr lang="en-IN" sz="2000" dirty="0" err="1">
-                <a:latin typeface="Calibri" panose="020F0502020204030204" pitchFamily="34" charset="0"/>
+                <a:latin typeface="+mj-lt"/>
                 <a:ea typeface="Calibri" panose="020F0502020204030204" pitchFamily="34" charset="0"/>
                 <a:cs typeface="Calibri" panose="020F0502020204030204" pitchFamily="34" charset="0"/>
               </a:rPr>
@@ -3613,7 +3609,7 @@
             </a:r>
             <a:r>
               <a:rPr lang="en-IN" sz="2000" dirty="0">
-                <a:latin typeface="Calibri" panose="020F0502020204030204" pitchFamily="34" charset="0"/>
+                <a:latin typeface="+mj-lt"/>
                 <a:ea typeface="Calibri" panose="020F0502020204030204" pitchFamily="34" charset="0"/>
                 <a:cs typeface="Calibri" panose="020F0502020204030204" pitchFamily="34" charset="0"/>
               </a:rPr>
@@ -3621,14 +3617,14 @@
             </a:r>
             <a:br>
               <a:rPr lang="en-IN" sz="2000" dirty="0">
-                <a:latin typeface="Calibri" panose="020F0502020204030204" pitchFamily="34" charset="0"/>
+                <a:latin typeface="+mj-lt"/>
                 <a:ea typeface="Calibri" panose="020F0502020204030204" pitchFamily="34" charset="0"/>
                 <a:cs typeface="Calibri" panose="020F0502020204030204" pitchFamily="34" charset="0"/>
               </a:rPr>
             </a:br>
             <a:r>
               <a:rPr lang="en-IN" sz="2000" dirty="0">
-                <a:latin typeface="Calibri" panose="020F0502020204030204" pitchFamily="34" charset="0"/>
+                <a:latin typeface="+mj-lt"/>
                 <a:ea typeface="Calibri" panose="020F0502020204030204" pitchFamily="34" charset="0"/>
                 <a:cs typeface="Calibri" panose="020F0502020204030204" pitchFamily="34" charset="0"/>
               </a:rPr>
@@ -3636,7 +3632,7 @@
             </a:r>
             <a:r>
               <a:rPr lang="en-IN" sz="2000" dirty="0" err="1">
-                <a:latin typeface="Calibri" panose="020F0502020204030204" pitchFamily="34" charset="0"/>
+                <a:latin typeface="+mj-lt"/>
                 <a:ea typeface="Calibri" panose="020F0502020204030204" pitchFamily="34" charset="0"/>
                 <a:cs typeface="Calibri" panose="020F0502020204030204" pitchFamily="34" charset="0"/>
               </a:rPr>
@@ -3644,7 +3640,7 @@
             </a:r>
             <a:r>
               <a:rPr lang="en-IN" sz="2000" dirty="0">
-                <a:latin typeface="Calibri" panose="020F0502020204030204" pitchFamily="34" charset="0"/>
+                <a:latin typeface="+mj-lt"/>
                 <a:ea typeface="Calibri" panose="020F0502020204030204" pitchFamily="34" charset="0"/>
                 <a:cs typeface="Calibri" panose="020F0502020204030204" pitchFamily="34" charset="0"/>
               </a:rPr>
@@ -3652,13 +3648,13 @@
             </a:r>
             <a:br>
               <a:rPr lang="en-IN" sz="2000" dirty="0">
-                <a:latin typeface="Calibri" panose="020F0502020204030204" pitchFamily="34" charset="0"/>
+                <a:latin typeface="+mj-lt"/>
                 <a:ea typeface="Calibri" panose="020F0502020204030204" pitchFamily="34" charset="0"/>
                 <a:cs typeface="Calibri" panose="020F0502020204030204" pitchFamily="34" charset="0"/>
               </a:rPr>
             </a:br>
             <a:endParaRPr lang="en-US" sz="2000" dirty="0">
-              <a:latin typeface="Calibri" panose="020F0502020204030204" pitchFamily="34" charset="0"/>
+              <a:latin typeface="+mj-lt"/>
               <a:ea typeface="Calibri" panose="020F0502020204030204" pitchFamily="34" charset="0"/>
               <a:cs typeface="Calibri" panose="020F0502020204030204" pitchFamily="34" charset="0"/>
             </a:endParaRPr>
@@ -3678,7 +3674,7 @@
               <a:buAutoNum type="arabicParenR"/>
             </a:pPr>
             <a:endParaRPr lang="en-US" sz="2000" dirty="0">
-              <a:latin typeface="Calibri" panose="020F0502020204030204" pitchFamily="34" charset="0"/>
+              <a:latin typeface="+mj-lt"/>
               <a:ea typeface="Calibri" panose="020F0502020204030204" pitchFamily="34" charset="0"/>
               <a:cs typeface="Calibri" panose="020F0502020204030204" pitchFamily="34" charset="0"/>
             </a:endParaRPr>
@@ -3701,7 +3697,7 @@
         </p:nvSpPr>
         <p:spPr>
           <a:xfrm>
-            <a:off x="1344141" y="3429000"/>
+            <a:off x="1140320" y="3413234"/>
             <a:ext cx="9912627" cy="1408172"/>
           </a:xfrm>
           <a:prstGeom prst="rect">
@@ -3748,7 +3744,6 @@
                 <a:solidFill>
                   <a:srgbClr val="002060"/>
                 </a:solidFill>
-                <a:latin typeface="Calibri" panose="020F0502020204030204" pitchFamily="34" charset="0"/>
                 <a:ea typeface="Calibri" panose="020F0502020204030204" pitchFamily="34" charset="0"/>
                 <a:cs typeface="Calibri" panose="020F0502020204030204" pitchFamily="34" charset="0"/>
               </a:rPr>
@@ -3759,14 +3754,12 @@
                 <a:solidFill>
                   <a:srgbClr val="002060"/>
                 </a:solidFill>
-                <a:latin typeface="Calibri" panose="020F0502020204030204" pitchFamily="34" charset="0"/>
                 <a:ea typeface="Calibri" panose="020F0502020204030204" pitchFamily="34" charset="0"/>
                 <a:cs typeface="Calibri" panose="020F0502020204030204" pitchFamily="34" charset="0"/>
               </a:rPr>
             </a:br>
             <a:r>
               <a:rPr lang="en-US" sz="2800" b="1" dirty="0">
-                <a:latin typeface="Calibri" panose="020F0502020204030204" pitchFamily="34" charset="0"/>
                 <a:ea typeface="Calibri" panose="020F0502020204030204" pitchFamily="34" charset="0"/>
                 <a:cs typeface="Calibri" panose="020F0502020204030204" pitchFamily="34" charset="0"/>
               </a:rPr>
@@ -3779,7 +3772,6 @@
                     <a:lumMod val="75000"/>
                   </a:schemeClr>
                 </a:solidFill>
-                <a:latin typeface="Calibri" panose="020F0502020204030204" pitchFamily="34" charset="0"/>
                 <a:ea typeface="Calibri" panose="020F0502020204030204" pitchFamily="34" charset="0"/>
                 <a:cs typeface="Calibri" panose="020F0502020204030204" pitchFamily="34" charset="0"/>
               </a:rPr>
@@ -3792,7 +3784,6 @@
                     <a:lumMod val="75000"/>
                   </a:schemeClr>
                 </a:solidFill>
-                <a:latin typeface="Calibri" panose="020F0502020204030204" pitchFamily="34" charset="0"/>
                 <a:ea typeface="Calibri" panose="020F0502020204030204" pitchFamily="34" charset="0"/>
                 <a:cs typeface="Calibri" panose="020F0502020204030204" pitchFamily="34" charset="0"/>
               </a:rPr>
@@ -3809,8 +3800,8 @@
         </p:nvSpPr>
         <p:spPr>
           <a:xfrm>
-            <a:off x="1344141" y="1728541"/>
-            <a:ext cx="10605660" cy="646331"/>
+            <a:off x="570160" y="1709740"/>
+            <a:ext cx="11051680" cy="646331"/>
           </a:xfrm>
           <a:prstGeom prst="rect">
             <a:avLst/>
@@ -3824,7 +3815,7 @@
           <a:p>
             <a:r>
               <a:rPr lang="en-US" sz="3600" dirty="0">
-                <a:latin typeface="Calibri" panose="020F0502020204030204" pitchFamily="34" charset="0"/>
+                <a:latin typeface="+mj-lt"/>
                 <a:ea typeface="Calibri" panose="020F0502020204030204" pitchFamily="34" charset="0"/>
                 <a:cs typeface="Calibri" panose="020F0502020204030204" pitchFamily="34" charset="0"/>
               </a:rPr>
@@ -3835,7 +3826,7 @@
                 <a:solidFill>
                   <a:srgbClr val="002060"/>
                 </a:solidFill>
-                <a:latin typeface="Calibri" panose="020F0502020204030204" pitchFamily="34" charset="0"/>
+                <a:latin typeface="+mj-lt"/>
                 <a:ea typeface="Calibri" panose="020F0502020204030204" pitchFamily="34" charset="0"/>
                 <a:cs typeface="Calibri" panose="020F0502020204030204" pitchFamily="34" charset="0"/>
               </a:rPr>
@@ -3860,7 +3851,7 @@
         </p:nvSpPr>
         <p:spPr>
           <a:xfrm>
-            <a:off x="2149586" y="1095654"/>
+            <a:off x="1945765" y="1079888"/>
             <a:ext cx="7951213" cy="595752"/>
           </a:xfrm>
           <a:prstGeom prst="rect">
@@ -3901,7 +3892,6 @@
                 <a:solidFill>
                   <a:srgbClr val="0070C0"/>
                 </a:solidFill>
-                <a:latin typeface="Calibri" panose="020F0502020204030204" pitchFamily="34" charset="0"/>
                 <a:ea typeface="Calibri" panose="020F0502020204030204" pitchFamily="34" charset="0"/>
                 <a:cs typeface="Calibri" panose="020F0502020204030204" pitchFamily="34" charset="0"/>
               </a:rPr>
@@ -3933,7 +3923,7 @@
         </p:blipFill>
         <p:spPr bwMode="auto">
           <a:xfrm>
-            <a:off x="4114799" y="15766"/>
+            <a:off x="3910978" y="0"/>
             <a:ext cx="4020789" cy="1196236"/>
           </a:xfrm>
           <a:prstGeom prst="rect">
@@ -6992,7 +6982,7 @@
         </p:spPr>
         <p:txBody>
           <a:bodyPr>
-            <a:normAutofit fontScale="92500" lnSpcReduction="10000"/>
+            <a:normAutofit fontScale="92500" lnSpcReduction="20000"/>
           </a:bodyPr>
           <a:lstStyle/>
           <a:p>
@@ -7288,14 +7278,14 @@
         <a:srgbClr val="954F72"/>
       </a:folHlink>
     </a:clrScheme>
-    <a:fontScheme name="Custom 1">
+    <a:fontScheme name="Custom 2">
       <a:majorFont>
-        <a:latin typeface="Corbel"/>
+        <a:latin typeface="Times New Roman"/>
         <a:ea typeface=""/>
         <a:cs typeface=""/>
       </a:majorFont>
       <a:minorFont>
-        <a:latin typeface="Corbel Light"/>
+        <a:latin typeface="Times New Roman"/>
         <a:ea typeface=""/>
         <a:cs typeface=""/>
       </a:minorFont>

</xml_diff>